<commit_message>
Update Turbo Charging Entity Framework Core Performance.pptx
</commit_message>
<xml_diff>
--- a/Turbo Charging Entity Framework Core Performance.pptx
+++ b/Turbo Charging Entity Framework Core Performance.pptx
@@ -20015,10 +20015,10 @@
       </p:sp>
       <p:pic>
         <p:nvPicPr>
-          <p:cNvPr id="9" name="Picture 8" descr="Qr code&#10;&#10;Description automatically generated">
+          <p:cNvPr id="4" name="Picture 3" descr="A qr code on a white background&#10;&#10;Description automatically generated">
             <a:extLst>
               <a:ext uri="{FF2B5EF4-FFF2-40B4-BE49-F238E27FC236}">
-                <a16:creationId xmlns:a16="http://schemas.microsoft.com/office/drawing/2014/main" id="{5E34CC82-7FF0-B837-C575-831FA043F6AE}"/>
+                <a16:creationId xmlns:a16="http://schemas.microsoft.com/office/drawing/2014/main" id="{FEE7886E-0F15-7C79-8CAE-E190F043D92F}"/>
               </a:ext>
             </a:extLst>
           </p:cNvPr>
@@ -20041,14 +20041,70 @@
         </p:blipFill>
         <p:spPr>
           <a:xfrm>
-            <a:off x="6726773" y="0"/>
-            <a:ext cx="5463639" cy="5463639"/>
+            <a:off x="6648307" y="319853"/>
+            <a:ext cx="5143786" cy="5143786"/>
           </a:xfrm>
           <a:prstGeom prst="rect">
             <a:avLst/>
           </a:prstGeom>
         </p:spPr>
       </p:pic>
+      <p:sp>
+        <p:nvSpPr>
+          <p:cNvPr id="7" name="TextBox 6">
+            <a:extLst>
+              <a:ext uri="{FF2B5EF4-FFF2-40B4-BE49-F238E27FC236}">
+                <a16:creationId xmlns:a16="http://schemas.microsoft.com/office/drawing/2014/main" id="{853C906C-42B5-0930-6986-E7D15589C95E}"/>
+              </a:ext>
+            </a:extLst>
+          </p:cNvPr>
+          <p:cNvSpPr txBox="1"/>
+          <p:nvPr/>
+        </p:nvSpPr>
+        <p:spPr>
+          <a:xfrm>
+            <a:off x="147815" y="1394361"/>
+            <a:ext cx="6582993" cy="461665"/>
+          </a:xfrm>
+          <a:prstGeom prst="rect">
+            <a:avLst/>
+          </a:prstGeom>
+          <a:noFill/>
+        </p:spPr>
+        <p:txBody>
+          <a:bodyPr wrap="square">
+            <a:spAutoFit/>
+          </a:bodyPr>
+          <a:lstStyle/>
+          <a:p>
+            <a:r>
+              <a:rPr lang="en-US" sz="2400" dirty="0"/>
+              <a:t>https://</a:t>
+            </a:r>
+            <a:r>
+              <a:rPr lang="en-US" sz="2400" dirty="0" err="1"/>
+              <a:t>github.com</a:t>
+            </a:r>
+            <a:r>
+              <a:rPr lang="en-US" sz="2400" dirty="0"/>
+              <a:t>/</a:t>
+            </a:r>
+            <a:r>
+              <a:rPr lang="en-US" sz="2400" dirty="0" err="1"/>
+              <a:t>cwoodruff</a:t>
+            </a:r>
+            <a:r>
+              <a:rPr lang="en-US" sz="2400" dirty="0"/>
+              <a:t>/</a:t>
+            </a:r>
+            <a:r>
+              <a:rPr lang="en-US" sz="2400" dirty="0" err="1"/>
+              <a:t>EFCorePerfDemos</a:t>
+            </a:r>
+            <a:endParaRPr lang="en-US" sz="2400" dirty="0"/>
+          </a:p>
+        </p:txBody>
+      </p:sp>
     </p:spTree>
     <p:extLst>
       <p:ext uri="{BB962C8B-B14F-4D97-AF65-F5344CB8AC3E}">

</xml_diff>